<commit_message>
persistance works, base MVP done
</commit_message>
<xml_diff>
--- a/pptx_files/Startup Valuation_082723.pptx
+++ b/pptx_files/Startup Valuation_082723.pptx
@@ -9472,9 +9472,9 @@
             </a:pPr>
             <a:r>
               <a:rPr lang="en"/>
-              <a:t>Non-Invasive Lactate Monitor Startup Valuation {TEST}</a:t>
+              <a:t>Non-Invasive Lactate Monitor Startup Valuation</a:t>
             </a:r>
-            <a:endParaRPr/>
+            <a:endParaRPr dirty="0"/>
           </a:p>
         </p:txBody>
       </p:sp>

</xml_diff>